<commit_message>
Tag 1 Hilfe Phillip
</commit_message>
<xml_diff>
--- a/Tag 1/01-Was ist ein Microcontroller.pptx
+++ b/Tag 1/01-Was ist ein Microcontroller.pptx
@@ -108,6 +108,11 @@
       </a:defRPr>
     </a:lvl9pPr>
   </p:defaultTextStyle>
+  <p:extLst>
+    <p:ext uri="{EFAFB233-063F-42B5-8137-9DF3F51BA10A}">
+      <p15:sldGuideLst xmlns:p15="http://schemas.microsoft.com/office/powerpoint/2012/main"/>
+    </p:ext>
+  </p:extLst>
 </p:presentation>
 </file>
 
@@ -258,7 +263,7 @@
           <a:p>
             <a:fld id="{D0FFAD1A-1AA5-40CD-8398-69FB8AC808B4}" type="datetimeFigureOut">
               <a:rPr lang="de-DE" smtClean="0"/>
-              <a:t>29.06.2022</a:t>
+              <a:t>09.08.2022</a:t>
             </a:fld>
             <a:endParaRPr lang="de-DE"/>
           </a:p>
@@ -456,7 +461,7 @@
           <a:p>
             <a:fld id="{D0FFAD1A-1AA5-40CD-8398-69FB8AC808B4}" type="datetimeFigureOut">
               <a:rPr lang="de-DE" smtClean="0"/>
-              <a:t>29.06.2022</a:t>
+              <a:t>09.08.2022</a:t>
             </a:fld>
             <a:endParaRPr lang="de-DE"/>
           </a:p>
@@ -664,7 +669,7 @@
           <a:p>
             <a:fld id="{D0FFAD1A-1AA5-40CD-8398-69FB8AC808B4}" type="datetimeFigureOut">
               <a:rPr lang="de-DE" smtClean="0"/>
-              <a:t>29.06.2022</a:t>
+              <a:t>09.08.2022</a:t>
             </a:fld>
             <a:endParaRPr lang="de-DE"/>
           </a:p>
@@ -862,7 +867,7 @@
           <a:p>
             <a:fld id="{D0FFAD1A-1AA5-40CD-8398-69FB8AC808B4}" type="datetimeFigureOut">
               <a:rPr lang="de-DE" smtClean="0"/>
-              <a:t>29.06.2022</a:t>
+              <a:t>09.08.2022</a:t>
             </a:fld>
             <a:endParaRPr lang="de-DE"/>
           </a:p>
@@ -1137,7 +1142,7 @@
           <a:p>
             <a:fld id="{D0FFAD1A-1AA5-40CD-8398-69FB8AC808B4}" type="datetimeFigureOut">
               <a:rPr lang="de-DE" smtClean="0"/>
-              <a:t>29.06.2022</a:t>
+              <a:t>09.08.2022</a:t>
             </a:fld>
             <a:endParaRPr lang="de-DE"/>
           </a:p>
@@ -1402,7 +1407,7 @@
           <a:p>
             <a:fld id="{D0FFAD1A-1AA5-40CD-8398-69FB8AC808B4}" type="datetimeFigureOut">
               <a:rPr lang="de-DE" smtClean="0"/>
-              <a:t>29.06.2022</a:t>
+              <a:t>09.08.2022</a:t>
             </a:fld>
             <a:endParaRPr lang="de-DE"/>
           </a:p>
@@ -1814,7 +1819,7 @@
           <a:p>
             <a:fld id="{D0FFAD1A-1AA5-40CD-8398-69FB8AC808B4}" type="datetimeFigureOut">
               <a:rPr lang="de-DE" smtClean="0"/>
-              <a:t>29.06.2022</a:t>
+              <a:t>09.08.2022</a:t>
             </a:fld>
             <a:endParaRPr lang="de-DE"/>
           </a:p>
@@ -1955,7 +1960,7 @@
           <a:p>
             <a:fld id="{D0FFAD1A-1AA5-40CD-8398-69FB8AC808B4}" type="datetimeFigureOut">
               <a:rPr lang="de-DE" smtClean="0"/>
-              <a:t>29.06.2022</a:t>
+              <a:t>09.08.2022</a:t>
             </a:fld>
             <a:endParaRPr lang="de-DE"/>
           </a:p>
@@ -2068,7 +2073,7 @@
           <a:p>
             <a:fld id="{D0FFAD1A-1AA5-40CD-8398-69FB8AC808B4}" type="datetimeFigureOut">
               <a:rPr lang="de-DE" smtClean="0"/>
-              <a:t>29.06.2022</a:t>
+              <a:t>09.08.2022</a:t>
             </a:fld>
             <a:endParaRPr lang="de-DE"/>
           </a:p>
@@ -2379,7 +2384,7 @@
           <a:p>
             <a:fld id="{D0FFAD1A-1AA5-40CD-8398-69FB8AC808B4}" type="datetimeFigureOut">
               <a:rPr lang="de-DE" smtClean="0"/>
-              <a:t>29.06.2022</a:t>
+              <a:t>09.08.2022</a:t>
             </a:fld>
             <a:endParaRPr lang="de-DE"/>
           </a:p>
@@ -2667,7 +2672,7 @@
           <a:p>
             <a:fld id="{D0FFAD1A-1AA5-40CD-8398-69FB8AC808B4}" type="datetimeFigureOut">
               <a:rPr lang="de-DE" smtClean="0"/>
-              <a:t>29.06.2022</a:t>
+              <a:t>09.08.2022</a:t>
             </a:fld>
             <a:endParaRPr lang="de-DE"/>
           </a:p>
@@ -2908,7 +2913,7 @@
           <a:p>
             <a:fld id="{D0FFAD1A-1AA5-40CD-8398-69FB8AC808B4}" type="datetimeFigureOut">
               <a:rPr lang="de-DE" smtClean="0"/>
-              <a:t>29.06.2022</a:t>
+              <a:t>09.08.2022</a:t>
             </a:fld>
             <a:endParaRPr lang="de-DE"/>
           </a:p>
@@ -3311,6 +3316,14 @@
 <file path=ppt/slides/slide1.xml><?xml version="1.0" encoding="utf-8"?>
 <p:sld xmlns:a="http://schemas.openxmlformats.org/drawingml/2006/main" xmlns:r="http://schemas.openxmlformats.org/officeDocument/2006/relationships" xmlns:p="http://schemas.openxmlformats.org/presentationml/2006/main">
   <p:cSld>
+    <p:bg>
+      <p:bgPr>
+        <a:solidFill>
+          <a:schemeClr val="bg1"/>
+        </a:solidFill>
+        <a:effectLst/>
+      </p:bgPr>
+    </p:bg>
     <p:spTree>
       <p:nvGrpSpPr>
         <p:cNvPr id="1" name=""/>
@@ -3327,6 +3340,72 @@
       </p:grpSpPr>
       <p:sp>
         <p:nvSpPr>
+          <p:cNvPr id="10" name="Rectangle 9">
+            <a:extLst>
+              <a:ext uri="{FF2B5EF4-FFF2-40B4-BE49-F238E27FC236}">
+                <a16:creationId xmlns:a16="http://schemas.microsoft.com/office/drawing/2014/main" id="{2E614F1C-2D93-42D0-B229-768199449923}"/>
+              </a:ext>
+              <a:ext uri="{C183D7F6-B498-43B3-948B-1728B52AA6E4}">
+                <adec:decorative xmlns:adec="http://schemas.microsoft.com/office/drawing/2017/decorative" val="1"/>
+              </a:ext>
+            </a:extLst>
+          </p:cNvPr>
+          <p:cNvSpPr>
+            <a:spLocks noGrp="1" noRot="1" noChangeAspect="1" noMove="1" noResize="1" noEditPoints="1" noAdjustHandles="1" noChangeArrowheads="1" noChangeShapeType="1" noTextEdit="1"/>
+          </p:cNvSpPr>
+          <p:nvPr>
+            <p:extLst>
+              <p:ext uri="{386F3935-93C4-4BCD-93E2-E3B085C9AB24}">
+                <p16:designElem xmlns:p16="http://schemas.microsoft.com/office/powerpoint/2015/main" val="1"/>
+              </p:ext>
+            </p:extLst>
+          </p:nvPr>
+        </p:nvSpPr>
+        <p:spPr bwMode="white">
+          <a:xfrm>
+            <a:off x="7403089" y="0"/>
+            <a:ext cx="4788912" cy="6858000"/>
+          </a:xfrm>
+          <a:prstGeom prst="rect">
+            <a:avLst/>
+          </a:prstGeom>
+          <a:solidFill>
+            <a:schemeClr val="tx1">
+              <a:lumMod val="85000"/>
+              <a:lumOff val="15000"/>
+            </a:schemeClr>
+          </a:solidFill>
+          <a:ln>
+            <a:noFill/>
+          </a:ln>
+        </p:spPr>
+        <p:style>
+          <a:lnRef idx="2">
+            <a:schemeClr val="accent1">
+              <a:shade val="50000"/>
+            </a:schemeClr>
+          </a:lnRef>
+          <a:fillRef idx="1">
+            <a:schemeClr val="accent1"/>
+          </a:fillRef>
+          <a:effectRef idx="0">
+            <a:schemeClr val="accent1"/>
+          </a:effectRef>
+          <a:fontRef idx="minor">
+            <a:schemeClr val="lt1"/>
+          </a:fontRef>
+        </p:style>
+        <p:txBody>
+          <a:bodyPr rtlCol="0" anchor="ctr"/>
+          <a:lstStyle/>
+          <a:p>
+            <a:pPr algn="ctr"/>
+            <a:endParaRPr lang="en-US"/>
+          </a:p>
+        </p:txBody>
+      </p:sp>
+      <p:sp>
+        <p:nvSpPr>
           <p:cNvPr id="2" name="Titel 1">
             <a:extLst>
               <a:ext uri="{FF2B5EF4-FFF2-40B4-BE49-F238E27FC236}">
@@ -3341,19 +3420,40 @@
             <p:ph type="ctrTitle"/>
           </p:nvPr>
         </p:nvSpPr>
-        <p:spPr/>
-        <p:txBody>
-          <a:bodyPr/>
-          <a:lstStyle/>
-          <a:p>
-            <a:r>
-              <a:rPr lang="de-DE" b="1" dirty="0"/>
+        <p:spPr>
+          <a:xfrm>
+            <a:off x="8174735" y="640081"/>
+            <a:ext cx="3377183" cy="3708895"/>
+          </a:xfrm>
+          <a:noFill/>
+        </p:spPr>
+        <p:txBody>
+          <a:bodyPr>
+            <a:normAutofit/>
+          </a:bodyPr>
+          <a:lstStyle/>
+          <a:p>
+            <a:pPr algn="l"/>
+            <a:r>
+              <a:rPr lang="de-DE" sz="3700" b="1">
+                <a:solidFill>
+                  <a:schemeClr val="bg1"/>
+                </a:solidFill>
+              </a:rPr>
               <a:t>Was ist ein Mikrocontroller?</a:t>
             </a:r>
             <a:br>
-              <a:rPr lang="de-DE" b="1" dirty="0"/>
+              <a:rPr lang="de-DE" sz="3700" b="1">
+                <a:solidFill>
+                  <a:schemeClr val="bg1"/>
+                </a:solidFill>
+              </a:rPr>
             </a:br>
-            <a:endParaRPr lang="de-DE" dirty="0"/>
+            <a:endParaRPr lang="de-DE" sz="3700">
+              <a:solidFill>
+                <a:schemeClr val="bg1"/>
+              </a:solidFill>
+            </a:endParaRPr>
           </a:p>
         </p:txBody>
       </p:sp>
@@ -3373,18 +3473,66 @@
             <p:ph type="subTitle" idx="1"/>
           </p:nvPr>
         </p:nvSpPr>
-        <p:spPr/>
-        <p:txBody>
-          <a:bodyPr/>
-          <a:lstStyle/>
-          <a:p>
-            <a:r>
-              <a:rPr lang="de-DE" dirty="0"/>
+        <p:spPr>
+          <a:xfrm>
+            <a:off x="8174735" y="4571999"/>
+            <a:ext cx="3377184" cy="1645921"/>
+          </a:xfrm>
+          <a:noFill/>
+        </p:spPr>
+        <p:txBody>
+          <a:bodyPr>
+            <a:normAutofit/>
+          </a:bodyPr>
+          <a:lstStyle/>
+          <a:p>
+            <a:pPr algn="l"/>
+            <a:r>
+              <a:rPr lang="de-DE" sz="2000">
+                <a:solidFill>
+                  <a:schemeClr val="bg1"/>
+                </a:solidFill>
+              </a:rPr>
               <a:t>Das Gehirn der Maschine</a:t>
             </a:r>
           </a:p>
         </p:txBody>
       </p:sp>
+      <p:pic>
+        <p:nvPicPr>
+          <p:cNvPr id="5" name="Grafik 4" descr="Ein Bild, das Text, Elektronik, Schaltkreis enthält.&#10;&#10;Automatisch generierte Beschreibung">
+            <a:extLst>
+              <a:ext uri="{FF2B5EF4-FFF2-40B4-BE49-F238E27FC236}">
+                <a16:creationId xmlns:a16="http://schemas.microsoft.com/office/drawing/2014/main" id="{624803C6-83DF-1428-01B3-85ABE416FF9B}"/>
+              </a:ext>
+            </a:extLst>
+          </p:cNvPr>
+          <p:cNvPicPr>
+            <a:picLocks noChangeAspect="1"/>
+          </p:cNvPicPr>
+          <p:nvPr/>
+        </p:nvPicPr>
+        <p:blipFill rotWithShape="1">
+          <a:blip r:embed="rId2">
+            <a:extLst>
+              <a:ext uri="{28A0092B-C50C-407E-A947-70E740481C1C}">
+                <a14:useLocalDpi xmlns:a14="http://schemas.microsoft.com/office/drawing/2010/main" val="0"/>
+              </a:ext>
+            </a:extLst>
+          </a:blip>
+          <a:srcRect r="2" b="11258"/>
+          <a:stretch/>
+        </p:blipFill>
+        <p:spPr>
+          <a:xfrm>
+            <a:off x="20" y="10"/>
+            <a:ext cx="7534636" cy="6857990"/>
+          </a:xfrm>
+          <a:prstGeom prst="rect">
+            <a:avLst/>
+          </a:prstGeom>
+        </p:spPr>
+      </p:pic>
     </p:spTree>
     <p:extLst>
       <p:ext uri="{BB962C8B-B14F-4D97-AF65-F5344CB8AC3E}">
@@ -3401,6 +3549,14 @@
 <file path=ppt/slides/slide2.xml><?xml version="1.0" encoding="utf-8"?>
 <p:sld xmlns:a="http://schemas.openxmlformats.org/drawingml/2006/main" xmlns:r="http://schemas.openxmlformats.org/officeDocument/2006/relationships" xmlns:p="http://schemas.openxmlformats.org/presentationml/2006/main">
   <p:cSld>
+    <p:bg>
+      <p:bgPr>
+        <a:solidFill>
+          <a:schemeClr val="bg1"/>
+        </a:solidFill>
+        <a:effectLst/>
+      </p:bgPr>
+    </p:bg>
     <p:spTree>
       <p:nvGrpSpPr>
         <p:cNvPr id="1" name=""/>
@@ -3431,9 +3587,16 @@
             <p:ph type="title"/>
           </p:nvPr>
         </p:nvSpPr>
-        <p:spPr/>
-        <p:txBody>
-          <a:bodyPr/>
+        <p:spPr>
+          <a:xfrm>
+            <a:off x="838200" y="365125"/>
+            <a:ext cx="6254496" cy="1828800"/>
+          </a:xfrm>
+        </p:spPr>
+        <p:txBody>
+          <a:bodyPr>
+            <a:normAutofit/>
+          </a:bodyPr>
           <a:lstStyle/>
           <a:p>
             <a:r>
@@ -3459,44 +3622,78 @@
             <p:ph idx="1"/>
           </p:nvPr>
         </p:nvSpPr>
-        <p:spPr/>
+        <p:spPr>
+          <a:xfrm>
+            <a:off x="838200" y="2322576"/>
+            <a:ext cx="6254496" cy="3858768"/>
+          </a:xfrm>
+        </p:spPr>
         <p:txBody>
           <a:bodyPr>
-            <a:normAutofit lnSpcReduction="10000"/>
+            <a:normAutofit/>
           </a:bodyPr>
           <a:lstStyle/>
           <a:p>
             <a:r>
-              <a:rPr lang="de-DE" dirty="0"/>
+              <a:rPr lang="de-DE" sz="2000"/>
               <a:t>Ein Mikrocontroller (µC, MCU) ist ein extrem kleiner Computer in einem einzelnen Chip, er bildet ein in sich geschlossenes System.</a:t>
             </a:r>
           </a:p>
           <a:p>
             <a:r>
-              <a:rPr lang="de-DE" dirty="0"/>
+              <a:rPr lang="de-DE" sz="2000"/>
               <a:t>Er besitzt einen Prozessor(CPU), Speicher(RAM/Register) und Ein- und Ausgabemöglichkeiten(IO).</a:t>
             </a:r>
           </a:p>
           <a:p>
             <a:r>
-              <a:rPr lang="de-DE" dirty="0"/>
+              <a:rPr lang="de-DE" sz="2000"/>
               <a:t>µC haben meistens eine spezifische Aufgabe</a:t>
             </a:r>
           </a:p>
           <a:p>
             <a:r>
-              <a:rPr lang="de-DE" dirty="0"/>
+              <a:rPr lang="de-DE" sz="2000"/>
               <a:t>µC können 8,16 und 32 Bit haben, was die Mathematische Genauigkeit in einem Takt beschriebt</a:t>
             </a:r>
           </a:p>
           <a:p>
             <a:r>
-              <a:rPr lang="de-DE" dirty="0"/>
+              <a:rPr lang="de-DE" sz="2000"/>
               <a:t>µC werden mit Instruktionen programmiert, dies nennt sich Assembler. Zum Glück können höhere Sprachen (C, C++, Python, R, …) zu Assembler konvertiert werden.</a:t>
             </a:r>
           </a:p>
         </p:txBody>
       </p:sp>
+      <p:pic>
+        <p:nvPicPr>
+          <p:cNvPr id="5" name="Picture 4" descr="Nahaufnahme einer Platine">
+            <a:extLst>
+              <a:ext uri="{FF2B5EF4-FFF2-40B4-BE49-F238E27FC236}">
+                <a16:creationId xmlns:a16="http://schemas.microsoft.com/office/drawing/2014/main" id="{48CB40E8-22FC-F306-A8E5-B8AF267B416C}"/>
+              </a:ext>
+            </a:extLst>
+          </p:cNvPr>
+          <p:cNvPicPr>
+            <a:picLocks noChangeAspect="1"/>
+          </p:cNvPicPr>
+          <p:nvPr/>
+        </p:nvPicPr>
+        <p:blipFill rotWithShape="1">
+          <a:blip r:embed="rId2"/>
+          <a:srcRect l="48831" r="6009" b="-1"/>
+          <a:stretch/>
+        </p:blipFill>
+        <p:spPr>
+          <a:xfrm>
+            <a:off x="7552266" y="10"/>
+            <a:ext cx="4639733" cy="6857990"/>
+          </a:xfrm>
+          <a:prstGeom prst="rect">
+            <a:avLst/>
+          </a:prstGeom>
+        </p:spPr>
+      </p:pic>
     </p:spTree>
     <p:extLst>
       <p:ext uri="{BB962C8B-B14F-4D97-AF65-F5344CB8AC3E}">
@@ -3505,7 +3702,7 @@
     </p:extLst>
   </p:cSld>
   <p:clrMapOvr>
-    <a:masterClrMapping/>
+    <a:overrideClrMapping bg1="dk1" tx1="lt1" bg2="dk2" tx2="lt2" accent1="accent1" accent2="accent2" accent3="accent3" accent4="accent4" accent5="accent5" accent6="accent6" hlink="hlink" folHlink="folHlink"/>
   </p:clrMapOvr>
 </p:sld>
 </file>
@@ -3513,6 +3710,14 @@
 <file path=ppt/slides/slide3.xml><?xml version="1.0" encoding="utf-8"?>
 <p:sld xmlns:a="http://schemas.openxmlformats.org/drawingml/2006/main" xmlns:r="http://schemas.openxmlformats.org/officeDocument/2006/relationships" xmlns:p="http://schemas.openxmlformats.org/presentationml/2006/main">
   <p:cSld>
+    <p:bg>
+      <p:bgPr>
+        <a:solidFill>
+          <a:schemeClr val="bg1"/>
+        </a:solidFill>
+        <a:effectLst/>
+      </p:bgPr>
+    </p:bg>
     <p:spTree>
       <p:nvGrpSpPr>
         <p:cNvPr id="1" name=""/>
@@ -3529,6 +3734,76 @@
       </p:grpSpPr>
       <p:sp>
         <p:nvSpPr>
+          <p:cNvPr id="8" name="Rectangle 7">
+            <a:extLst>
+              <a:ext uri="{FF2B5EF4-FFF2-40B4-BE49-F238E27FC236}">
+                <a16:creationId xmlns:a16="http://schemas.microsoft.com/office/drawing/2014/main" id="{A7AE9375-4664-4DB2-922D-2782A6E439AC}"/>
+              </a:ext>
+              <a:ext uri="{C183D7F6-B498-43B3-948B-1728B52AA6E4}">
+                <adec:decorative xmlns:adec="http://schemas.microsoft.com/office/drawing/2017/decorative" val="1"/>
+              </a:ext>
+            </a:extLst>
+          </p:cNvPr>
+          <p:cNvSpPr>
+            <a:spLocks noGrp="1" noRot="1" noChangeAspect="1" noMove="1" noResize="1" noEditPoints="1" noAdjustHandles="1" noChangeArrowheads="1" noChangeShapeType="1" noTextEdit="1"/>
+          </p:cNvSpPr>
+          <p:nvPr>
+            <p:extLst>
+              <p:ext uri="{386F3935-93C4-4BCD-93E2-E3B085C9AB24}">
+                <p16:designElem xmlns:p16="http://schemas.microsoft.com/office/powerpoint/2015/main" val="1"/>
+              </p:ext>
+            </p:extLst>
+          </p:nvPr>
+        </p:nvSpPr>
+        <p:spPr>
+          <a:xfrm>
+            <a:off x="0" y="0"/>
+            <a:ext cx="12192000" cy="6858000"/>
+          </a:xfrm>
+          <a:prstGeom prst="rect">
+            <a:avLst/>
+          </a:prstGeom>
+          <a:solidFill>
+            <a:schemeClr val="tx1">
+              <a:lumMod val="95000"/>
+              <a:lumOff val="5000"/>
+            </a:schemeClr>
+          </a:solidFill>
+          <a:ln>
+            <a:noFill/>
+          </a:ln>
+        </p:spPr>
+        <p:style>
+          <a:lnRef idx="2">
+            <a:schemeClr val="accent1">
+              <a:shade val="50000"/>
+            </a:schemeClr>
+          </a:lnRef>
+          <a:fillRef idx="1">
+            <a:schemeClr val="accent1"/>
+          </a:fillRef>
+          <a:effectRef idx="0">
+            <a:schemeClr val="accent1"/>
+          </a:effectRef>
+          <a:fontRef idx="minor">
+            <a:schemeClr val="lt1"/>
+          </a:fontRef>
+        </p:style>
+        <p:txBody>
+          <a:bodyPr rtlCol="0" anchor="ctr"/>
+          <a:lstStyle/>
+          <a:p>
+            <a:pPr algn="ctr"/>
+            <a:endParaRPr lang="en-US" dirty="0">
+              <a:solidFill>
+                <a:schemeClr val="tx1"/>
+              </a:solidFill>
+            </a:endParaRPr>
+          </a:p>
+        </p:txBody>
+      </p:sp>
+      <p:sp>
+        <p:nvSpPr>
           <p:cNvPr id="2" name="Titel 1">
             <a:extLst>
               <a:ext uri="{FF2B5EF4-FFF2-40B4-BE49-F238E27FC236}">
@@ -3543,18 +3818,82 @@
             <p:ph type="title"/>
           </p:nvPr>
         </p:nvSpPr>
-        <p:spPr/>
-        <p:txBody>
-          <a:bodyPr/>
-          <a:lstStyle/>
-          <a:p>
-            <a:r>
-              <a:rPr lang="de-DE" dirty="0"/>
+        <p:spPr>
+          <a:xfrm>
+            <a:off x="838200" y="669925"/>
+            <a:ext cx="4508946" cy="1325563"/>
+          </a:xfrm>
+        </p:spPr>
+        <p:txBody>
+          <a:bodyPr anchor="b">
+            <a:normAutofit/>
+          </a:bodyPr>
+          <a:lstStyle/>
+          <a:p>
+            <a:pPr algn="r"/>
+            <a:r>
+              <a:rPr lang="de-DE">
+                <a:solidFill>
+                  <a:schemeClr val="bg1"/>
+                </a:solidFill>
+              </a:rPr>
               <a:t>Weitere Teile des µC</a:t>
             </a:r>
           </a:p>
         </p:txBody>
       </p:sp>
+      <p:cxnSp>
+        <p:nvCxnSpPr>
+          <p:cNvPr id="10" name="Straight Connector 9">
+            <a:extLst>
+              <a:ext uri="{FF2B5EF4-FFF2-40B4-BE49-F238E27FC236}">
+                <a16:creationId xmlns:a16="http://schemas.microsoft.com/office/drawing/2014/main" id="{EE504C98-6397-41C1-A8D8-2D9C4ED307E0}"/>
+              </a:ext>
+              <a:ext uri="{C183D7F6-B498-43B3-948B-1728B52AA6E4}">
+                <adec:decorative xmlns:adec="http://schemas.microsoft.com/office/drawing/2017/decorative" val="1"/>
+              </a:ext>
+            </a:extLst>
+          </p:cNvPr>
+          <p:cNvCxnSpPr>
+            <a:cxnSpLocks noGrp="1" noRot="1" noChangeAspect="1" noMove="1" noResize="1" noEditPoints="1" noAdjustHandles="1" noChangeArrowheads="1" noChangeShapeType="1"/>
+          </p:cNvCxnSpPr>
+          <p:nvPr>
+            <p:extLst>
+              <p:ext uri="{386F3935-93C4-4BCD-93E2-E3B085C9AB24}">
+                <p16:designElem xmlns:p16="http://schemas.microsoft.com/office/powerpoint/2015/main" val="1"/>
+              </p:ext>
+            </p:extLst>
+          </p:nvPr>
+        </p:nvCxnSpPr>
+        <p:spPr>
+          <a:xfrm flipH="1">
+            <a:off x="126210" y="2026340"/>
+            <a:ext cx="5220936" cy="0"/>
+          </a:xfrm>
+          <a:prstGeom prst="line">
+            <a:avLst/>
+          </a:prstGeom>
+          <a:ln w="12700">
+            <a:solidFill>
+              <a:schemeClr val="accent2"/>
+            </a:solidFill>
+          </a:ln>
+        </p:spPr>
+        <p:style>
+          <a:lnRef idx="1">
+            <a:schemeClr val="accent1"/>
+          </a:lnRef>
+          <a:fillRef idx="0">
+            <a:schemeClr val="accent1"/>
+          </a:fillRef>
+          <a:effectRef idx="0">
+            <a:schemeClr val="accent1"/>
+          </a:effectRef>
+          <a:fontRef idx="minor">
+            <a:schemeClr val="tx1"/>
+          </a:fontRef>
+        </p:style>
+      </p:cxnSp>
       <p:sp>
         <p:nvSpPr>
           <p:cNvPr id="3" name="Inhaltsplatzhalter 2">
@@ -3571,76 +3910,162 @@
             <p:ph idx="1"/>
           </p:nvPr>
         </p:nvSpPr>
-        <p:spPr/>
-        <p:txBody>
-          <a:bodyPr/>
+        <p:spPr>
+          <a:xfrm>
+            <a:off x="1392667" y="2398957"/>
+            <a:ext cx="9406666" cy="3526144"/>
+          </a:xfrm>
+        </p:spPr>
+        <p:txBody>
+          <a:bodyPr>
+            <a:normAutofit/>
+          </a:bodyPr>
           <a:lstStyle/>
           <a:p>
             <a:pPr marL="0" indent="0">
               <a:buNone/>
             </a:pPr>
             <a:r>
-              <a:rPr lang="de-DE" dirty="0"/>
+              <a:rPr lang="de-DE" sz="2000">
+                <a:solidFill>
+                  <a:schemeClr val="bg1"/>
+                </a:solidFill>
+              </a:rPr>
               <a:t>Ein µC kann Hardware besitzen, welche besondere Aufgaben erfüllt.</a:t>
             </a:r>
           </a:p>
           <a:p>
             <a:r>
-              <a:rPr lang="de-DE" dirty="0"/>
+              <a:rPr lang="de-DE" sz="2000">
+                <a:solidFill>
+                  <a:schemeClr val="bg1"/>
+                </a:solidFill>
+              </a:rPr>
               <a:t>Sensoren (Beschleunigung, Temperatur, …)</a:t>
             </a:r>
           </a:p>
           <a:p>
             <a:r>
-              <a:rPr lang="de-DE" dirty="0"/>
+              <a:rPr lang="de-DE" sz="2000">
+                <a:solidFill>
+                  <a:schemeClr val="bg1"/>
+                </a:solidFill>
+              </a:rPr>
               <a:t>Interfaces (UART, SPI, I2C, USB, CAN, WLAN, …)</a:t>
             </a:r>
           </a:p>
           <a:p>
             <a:r>
-              <a:rPr lang="de-DE" dirty="0"/>
+              <a:rPr lang="de-DE" sz="2000">
+                <a:solidFill>
+                  <a:schemeClr val="bg1"/>
+                </a:solidFill>
+              </a:rPr>
               <a:t>Analoge Schnittstellen (DAC, ADC, …)</a:t>
             </a:r>
           </a:p>
           <a:p>
             <a:r>
-              <a:rPr lang="de-DE" dirty="0"/>
+              <a:rPr lang="de-DE" sz="2000">
+                <a:solidFill>
+                  <a:schemeClr val="bg1"/>
+                </a:solidFill>
+              </a:rPr>
               <a:t>Digitale Ein und Ausgaben (PWM, …)</a:t>
             </a:r>
           </a:p>
           <a:p>
             <a:r>
-              <a:rPr lang="de-DE" dirty="0"/>
+              <a:rPr lang="de-DE" sz="2000">
+                <a:solidFill>
+                  <a:schemeClr val="bg1"/>
+                </a:solidFill>
+              </a:rPr>
               <a:t>Verschlüsselungshardware (SHA, RSA, AES, RNG, HMAC, …)</a:t>
             </a:r>
           </a:p>
           <a:p>
             <a:r>
-              <a:rPr lang="de-DE" dirty="0"/>
-              <a:t>Funksysteme (RF) (RF </a:t>
-            </a:r>
-            <a:r>
-              <a:rPr lang="de-DE" dirty="0" err="1"/>
-              <a:t>Reciver</a:t>
-            </a:r>
-            <a:r>
-              <a:rPr lang="de-DE" dirty="0"/>
-              <a:t> und Transmitter, </a:t>
-            </a:r>
-            <a:r>
-              <a:rPr lang="de-DE" dirty="0" err="1"/>
-              <a:t>Balun</a:t>
-            </a:r>
-            <a:r>
-              <a:rPr lang="de-DE" dirty="0"/>
-              <a:t>, …)</a:t>
-            </a:r>
-          </a:p>
-          <a:p>
-            <a:r>
-              <a:rPr lang="de-DE" dirty="0"/>
+              <a:rPr lang="de-DE" sz="2000">
+                <a:solidFill>
+                  <a:schemeClr val="bg1"/>
+                </a:solidFill>
+              </a:rPr>
+              <a:t>Funksysteme (RF) (RF Reciver und Transmitter, Balun, …)</a:t>
+            </a:r>
+          </a:p>
+          <a:p>
+            <a:r>
+              <a:rPr lang="de-DE" sz="2000">
+                <a:solidFill>
+                  <a:schemeClr val="bg1"/>
+                </a:solidFill>
+              </a:rPr>
               <a:t>Taktgeber (Clock)</a:t>
             </a:r>
+          </a:p>
+        </p:txBody>
+      </p:sp>
+      <p:sp>
+        <p:nvSpPr>
+          <p:cNvPr id="12" name="Rectangle 11">
+            <a:extLst>
+              <a:ext uri="{FF2B5EF4-FFF2-40B4-BE49-F238E27FC236}">
+                <a16:creationId xmlns:a16="http://schemas.microsoft.com/office/drawing/2014/main" id="{9DD005C1-8C51-42D6-9BEE-B9B83849743D}"/>
+              </a:ext>
+              <a:ext uri="{C183D7F6-B498-43B3-948B-1728B52AA6E4}">
+                <adec:decorative xmlns:adec="http://schemas.microsoft.com/office/drawing/2017/decorative" val="1"/>
+              </a:ext>
+            </a:extLst>
+          </p:cNvPr>
+          <p:cNvSpPr>
+            <a:spLocks noGrp="1" noRot="1" noChangeAspect="1" noMove="1" noResize="1" noEditPoints="1" noAdjustHandles="1" noChangeArrowheads="1" noChangeShapeType="1" noTextEdit="1"/>
+          </p:cNvSpPr>
+          <p:nvPr>
+            <p:extLst>
+              <p:ext uri="{386F3935-93C4-4BCD-93E2-E3B085C9AB24}">
+                <p16:designElem xmlns:p16="http://schemas.microsoft.com/office/powerpoint/2015/main" val="1"/>
+              </p:ext>
+            </p:extLst>
+          </p:nvPr>
+        </p:nvSpPr>
+        <p:spPr>
+          <a:xfrm>
+            <a:off x="126206" y="115193"/>
+            <a:ext cx="11939588" cy="6627614"/>
+          </a:xfrm>
+          <a:prstGeom prst="rect">
+            <a:avLst/>
+          </a:prstGeom>
+          <a:noFill/>
+          <a:ln w="12700">
+            <a:solidFill>
+              <a:schemeClr val="accent2"/>
+            </a:solidFill>
+          </a:ln>
+        </p:spPr>
+        <p:style>
+          <a:lnRef idx="2">
+            <a:schemeClr val="accent1">
+              <a:shade val="50000"/>
+            </a:schemeClr>
+          </a:lnRef>
+          <a:fillRef idx="1">
+            <a:schemeClr val="accent1"/>
+          </a:fillRef>
+          <a:effectRef idx="0">
+            <a:schemeClr val="accent1"/>
+          </a:effectRef>
+          <a:fontRef idx="minor">
+            <a:schemeClr val="lt1"/>
+          </a:fontRef>
+        </p:style>
+        <p:txBody>
+          <a:bodyPr rtlCol="0" anchor="ctr"/>
+          <a:lstStyle/>
+          <a:p>
+            <a:pPr algn="ctr"/>
+            <a:endParaRPr lang="en-US"/>
           </a:p>
         </p:txBody>
       </p:sp>
@@ -3660,6 +4085,14 @@
 <file path=ppt/slides/slide4.xml><?xml version="1.0" encoding="utf-8"?>
 <p:sld xmlns:a="http://schemas.openxmlformats.org/drawingml/2006/main" xmlns:r="http://schemas.openxmlformats.org/officeDocument/2006/relationships" xmlns:p="http://schemas.openxmlformats.org/presentationml/2006/main">
   <p:cSld>
+    <p:bg>
+      <p:bgPr>
+        <a:solidFill>
+          <a:schemeClr val="bg1"/>
+        </a:solidFill>
+        <a:effectLst/>
+      </p:bgPr>
+    </p:bg>
     <p:spTree>
       <p:nvGrpSpPr>
         <p:cNvPr id="1" name=""/>
@@ -3676,6 +4109,76 @@
       </p:grpSpPr>
       <p:sp>
         <p:nvSpPr>
+          <p:cNvPr id="8" name="Rectangle 7">
+            <a:extLst>
+              <a:ext uri="{FF2B5EF4-FFF2-40B4-BE49-F238E27FC236}">
+                <a16:creationId xmlns:a16="http://schemas.microsoft.com/office/drawing/2014/main" id="{E8A8EAB8-D2FF-444D-B34B-7D32F106AD0E}"/>
+              </a:ext>
+              <a:ext uri="{C183D7F6-B498-43B3-948B-1728B52AA6E4}">
+                <adec:decorative xmlns:adec="http://schemas.microsoft.com/office/drawing/2017/decorative" val="1"/>
+              </a:ext>
+            </a:extLst>
+          </p:cNvPr>
+          <p:cNvSpPr>
+            <a:spLocks noGrp="1" noRot="1" noChangeAspect="1" noMove="1" noResize="1" noEditPoints="1" noAdjustHandles="1" noChangeArrowheads="1" noChangeShapeType="1" noTextEdit="1"/>
+          </p:cNvSpPr>
+          <p:nvPr>
+            <p:extLst>
+              <p:ext uri="{386F3935-93C4-4BCD-93E2-E3B085C9AB24}">
+                <p16:designElem xmlns:p16="http://schemas.microsoft.com/office/powerpoint/2015/main" val="1"/>
+              </p:ext>
+            </p:extLst>
+          </p:nvPr>
+        </p:nvSpPr>
+        <p:spPr>
+          <a:xfrm>
+            <a:off x="0" y="0"/>
+            <a:ext cx="12192000" cy="6858000"/>
+          </a:xfrm>
+          <a:prstGeom prst="rect">
+            <a:avLst/>
+          </a:prstGeom>
+          <a:solidFill>
+            <a:schemeClr val="tx1">
+              <a:lumMod val="95000"/>
+              <a:lumOff val="5000"/>
+            </a:schemeClr>
+          </a:solidFill>
+          <a:ln>
+            <a:noFill/>
+          </a:ln>
+        </p:spPr>
+        <p:style>
+          <a:lnRef idx="2">
+            <a:schemeClr val="accent1">
+              <a:shade val="50000"/>
+            </a:schemeClr>
+          </a:lnRef>
+          <a:fillRef idx="1">
+            <a:schemeClr val="accent1"/>
+          </a:fillRef>
+          <a:effectRef idx="0">
+            <a:schemeClr val="accent1"/>
+          </a:effectRef>
+          <a:fontRef idx="minor">
+            <a:schemeClr val="lt1"/>
+          </a:fontRef>
+        </p:style>
+        <p:txBody>
+          <a:bodyPr rtlCol="0" anchor="ctr"/>
+          <a:lstStyle/>
+          <a:p>
+            <a:pPr algn="ctr"/>
+            <a:endParaRPr lang="en-US" dirty="0">
+              <a:solidFill>
+                <a:schemeClr val="bg1"/>
+              </a:solidFill>
+            </a:endParaRPr>
+          </a:p>
+        </p:txBody>
+      </p:sp>
+      <p:sp>
+        <p:nvSpPr>
           <p:cNvPr id="2" name="Titel 1">
             <a:extLst>
               <a:ext uri="{FF2B5EF4-FFF2-40B4-BE49-F238E27FC236}">
@@ -3690,18 +4193,133 @@
             <p:ph type="title"/>
           </p:nvPr>
         </p:nvSpPr>
-        <p:spPr/>
-        <p:txBody>
-          <a:bodyPr/>
-          <a:lstStyle/>
-          <a:p>
-            <a:r>
-              <a:rPr lang="de-DE" dirty="0"/>
+        <p:spPr>
+          <a:xfrm>
+            <a:off x="1014141" y="1450655"/>
+            <a:ext cx="3932030" cy="3956690"/>
+          </a:xfrm>
+        </p:spPr>
+        <p:txBody>
+          <a:bodyPr anchor="ctr">
+            <a:normAutofit/>
+          </a:bodyPr>
+          <a:lstStyle/>
+          <a:p>
+            <a:r>
+              <a:rPr lang="de-DE" sz="5000">
+                <a:solidFill>
+                  <a:schemeClr val="bg1"/>
+                </a:solidFill>
+              </a:rPr>
               <a:t>Anwendungen</a:t>
             </a:r>
           </a:p>
         </p:txBody>
       </p:sp>
+      <p:cxnSp>
+        <p:nvCxnSpPr>
+          <p:cNvPr id="10" name="Straight Connector 9">
+            <a:extLst>
+              <a:ext uri="{FF2B5EF4-FFF2-40B4-BE49-F238E27FC236}">
+                <a16:creationId xmlns:a16="http://schemas.microsoft.com/office/drawing/2014/main" id="{067633D1-6EE6-4118-B9F0-B363477BEE7A}"/>
+              </a:ext>
+              <a:ext uri="{C183D7F6-B498-43B3-948B-1728B52AA6E4}">
+                <adec:decorative xmlns:adec="http://schemas.microsoft.com/office/drawing/2017/decorative" val="1"/>
+              </a:ext>
+            </a:extLst>
+          </p:cNvPr>
+          <p:cNvCxnSpPr>
+            <a:cxnSpLocks noGrp="1" noRot="1" noChangeAspect="1" noMove="1" noResize="1" noEditPoints="1" noAdjustHandles="1" noChangeArrowheads="1" noChangeShapeType="1"/>
+          </p:cNvCxnSpPr>
+          <p:nvPr>
+            <p:extLst>
+              <p:ext uri="{386F3935-93C4-4BCD-93E2-E3B085C9AB24}">
+                <p16:designElem xmlns:p16="http://schemas.microsoft.com/office/powerpoint/2015/main" val="1"/>
+              </p:ext>
+            </p:extLst>
+          </p:nvPr>
+        </p:nvCxnSpPr>
+        <p:spPr>
+          <a:xfrm flipH="1">
+            <a:off x="1014141" y="1450655"/>
+            <a:ext cx="3932030" cy="0"/>
+          </a:xfrm>
+          <a:prstGeom prst="line">
+            <a:avLst/>
+          </a:prstGeom>
+          <a:ln w="12700">
+            <a:solidFill>
+              <a:schemeClr val="accent2"/>
+            </a:solidFill>
+          </a:ln>
+        </p:spPr>
+        <p:style>
+          <a:lnRef idx="1">
+            <a:schemeClr val="accent1"/>
+          </a:lnRef>
+          <a:fillRef idx="0">
+            <a:schemeClr val="accent1"/>
+          </a:fillRef>
+          <a:effectRef idx="0">
+            <a:schemeClr val="accent1"/>
+          </a:effectRef>
+          <a:fontRef idx="minor">
+            <a:schemeClr val="tx1"/>
+          </a:fontRef>
+        </p:style>
+      </p:cxnSp>
+      <p:cxnSp>
+        <p:nvCxnSpPr>
+          <p:cNvPr id="12" name="Straight Connector 11">
+            <a:extLst>
+              <a:ext uri="{FF2B5EF4-FFF2-40B4-BE49-F238E27FC236}">
+                <a16:creationId xmlns:a16="http://schemas.microsoft.com/office/drawing/2014/main" id="{4AD7FFC6-42A9-49CB-B5E9-B3F6B038331B}"/>
+              </a:ext>
+              <a:ext uri="{C183D7F6-B498-43B3-948B-1728B52AA6E4}">
+                <adec:decorative xmlns:adec="http://schemas.microsoft.com/office/drawing/2017/decorative" val="1"/>
+              </a:ext>
+            </a:extLst>
+          </p:cNvPr>
+          <p:cNvCxnSpPr>
+            <a:cxnSpLocks noGrp="1" noRot="1" noChangeAspect="1" noMove="1" noResize="1" noEditPoints="1" noAdjustHandles="1" noChangeArrowheads="1" noChangeShapeType="1"/>
+          </p:cNvCxnSpPr>
+          <p:nvPr>
+            <p:extLst>
+              <p:ext uri="{386F3935-93C4-4BCD-93E2-E3B085C9AB24}">
+                <p16:designElem xmlns:p16="http://schemas.microsoft.com/office/powerpoint/2015/main" val="1"/>
+              </p:ext>
+            </p:extLst>
+          </p:nvPr>
+        </p:nvCxnSpPr>
+        <p:spPr>
+          <a:xfrm flipH="1">
+            <a:off x="1014141" y="5408571"/>
+            <a:ext cx="3932030" cy="0"/>
+          </a:xfrm>
+          <a:prstGeom prst="line">
+            <a:avLst/>
+          </a:prstGeom>
+          <a:ln w="12700">
+            <a:solidFill>
+              <a:schemeClr val="accent2"/>
+            </a:solidFill>
+          </a:ln>
+        </p:spPr>
+        <p:style>
+          <a:lnRef idx="1">
+            <a:schemeClr val="accent1"/>
+          </a:lnRef>
+          <a:fillRef idx="0">
+            <a:schemeClr val="accent1"/>
+          </a:fillRef>
+          <a:effectRef idx="0">
+            <a:schemeClr val="accent1"/>
+          </a:effectRef>
+          <a:fontRef idx="minor">
+            <a:schemeClr val="tx1"/>
+          </a:fontRef>
+        </p:style>
+      </p:cxnSp>
       <p:sp>
         <p:nvSpPr>
           <p:cNvPr id="3" name="Inhaltsplatzhalter 2">
@@ -3718,49 +4336,84 @@
             <p:ph idx="1"/>
           </p:nvPr>
         </p:nvSpPr>
-        <p:spPr/>
-        <p:txBody>
-          <a:bodyPr/>
-          <a:lstStyle/>
-          <a:p>
-            <a:r>
-              <a:rPr lang="de-DE" dirty="0"/>
+        <p:spPr>
+          <a:xfrm>
+            <a:off x="6096000" y="1108061"/>
+            <a:ext cx="5008901" cy="4571972"/>
+          </a:xfrm>
+        </p:spPr>
+        <p:txBody>
+          <a:bodyPr anchor="ctr">
+            <a:normAutofit/>
+          </a:bodyPr>
+          <a:lstStyle/>
+          <a:p>
+            <a:r>
+              <a:rPr lang="de-DE" sz="2000">
+                <a:solidFill>
+                  <a:schemeClr val="bg1"/>
+                </a:solidFill>
+              </a:rPr>
               <a:t>Automatisierung</a:t>
             </a:r>
           </a:p>
           <a:p>
             <a:r>
-              <a:rPr lang="de-DE" dirty="0"/>
+              <a:rPr lang="de-DE" sz="2000">
+                <a:solidFill>
+                  <a:schemeClr val="bg1"/>
+                </a:solidFill>
+              </a:rPr>
               <a:t>Robotik</a:t>
             </a:r>
           </a:p>
           <a:p>
             <a:r>
-              <a:rPr lang="de-DE" dirty="0"/>
+              <a:rPr lang="de-DE" sz="2000">
+                <a:solidFill>
+                  <a:schemeClr val="bg1"/>
+                </a:solidFill>
+              </a:rPr>
               <a:t>Unterhaltungselektronik</a:t>
             </a:r>
           </a:p>
           <a:p>
             <a:r>
-              <a:rPr lang="de-DE" dirty="0"/>
+              <a:rPr lang="de-DE" sz="2000">
+                <a:solidFill>
+                  <a:schemeClr val="bg1"/>
+                </a:solidFill>
+              </a:rPr>
               <a:t>Haushaltsgeräte</a:t>
             </a:r>
           </a:p>
           <a:p>
             <a:r>
-              <a:rPr lang="de-DE" dirty="0"/>
+              <a:rPr lang="de-DE" sz="2000">
+                <a:solidFill>
+                  <a:schemeClr val="bg1"/>
+                </a:solidFill>
+              </a:rPr>
               <a:t>Medizin- und Laborgeräte</a:t>
             </a:r>
           </a:p>
           <a:p>
             <a:r>
-              <a:rPr lang="de-DE" dirty="0"/>
+              <a:rPr lang="de-DE" sz="2000">
+                <a:solidFill>
+                  <a:schemeClr val="bg1"/>
+                </a:solidFill>
+              </a:rPr>
               <a:t>Automobilindustrie</a:t>
             </a:r>
           </a:p>
           <a:p>
             <a:r>
-              <a:rPr lang="de-DE" dirty="0"/>
+              <a:rPr lang="de-DE" sz="2000">
+                <a:solidFill>
+                  <a:schemeClr val="bg1"/>
+                </a:solidFill>
+              </a:rPr>
               <a:t>Steuerung von Industrie- und Produktionsumgebungen</a:t>
             </a:r>
           </a:p>
@@ -3782,6 +4435,14 @@
 <file path=ppt/slides/slide5.xml><?xml version="1.0" encoding="utf-8"?>
 <p:sld xmlns:a="http://schemas.openxmlformats.org/drawingml/2006/main" xmlns:r="http://schemas.openxmlformats.org/officeDocument/2006/relationships" xmlns:p="http://schemas.openxmlformats.org/presentationml/2006/main">
   <p:cSld>
+    <p:bg>
+      <p:bgPr>
+        <a:solidFill>
+          <a:schemeClr val="bg1"/>
+        </a:solidFill>
+        <a:effectLst/>
+      </p:bgPr>
+    </p:bg>
     <p:spTree>
       <p:nvGrpSpPr>
         <p:cNvPr id="1" name=""/>
@@ -3798,6 +4459,78 @@
       </p:grpSpPr>
       <p:sp>
         <p:nvSpPr>
+          <p:cNvPr id="8" name="Rectangle 7">
+            <a:extLst>
+              <a:ext uri="{FF2B5EF4-FFF2-40B4-BE49-F238E27FC236}">
+                <a16:creationId xmlns:a16="http://schemas.microsoft.com/office/drawing/2014/main" id="{FB5B0058-AF13-4859-B429-4EDDE2A26F7F}"/>
+              </a:ext>
+              <a:ext uri="{C183D7F6-B498-43B3-948B-1728B52AA6E4}">
+                <adec:decorative xmlns:adec="http://schemas.microsoft.com/office/drawing/2017/decorative" val="1"/>
+              </a:ext>
+            </a:extLst>
+          </p:cNvPr>
+          <p:cNvSpPr>
+            <a:spLocks noGrp="1" noRot="1" noChangeAspect="1" noMove="1" noResize="1" noEditPoints="1" noAdjustHandles="1" noChangeArrowheads="1" noChangeShapeType="1" noTextEdit="1"/>
+          </p:cNvSpPr>
+          <p:nvPr>
+            <p:extLst>
+              <p:ext uri="{386F3935-93C4-4BCD-93E2-E3B085C9AB24}">
+                <p16:designElem xmlns:p16="http://schemas.microsoft.com/office/powerpoint/2015/main" val="1"/>
+              </p:ext>
+            </p:extLst>
+          </p:nvPr>
+        </p:nvSpPr>
+        <p:spPr>
+          <a:xfrm>
+            <a:off x="0" y="0"/>
+            <a:ext cx="12192000" cy="6858000"/>
+          </a:xfrm>
+          <a:prstGeom prst="rect">
+            <a:avLst/>
+          </a:prstGeom>
+          <a:solidFill>
+            <a:schemeClr val="tx1">
+              <a:lumMod val="95000"/>
+              <a:lumOff val="5000"/>
+            </a:schemeClr>
+          </a:solidFill>
+          <a:ln>
+            <a:noFill/>
+          </a:ln>
+        </p:spPr>
+        <p:style>
+          <a:lnRef idx="2">
+            <a:schemeClr val="accent1">
+              <a:shade val="50000"/>
+            </a:schemeClr>
+          </a:lnRef>
+          <a:fillRef idx="1">
+            <a:schemeClr val="accent1"/>
+          </a:fillRef>
+          <a:effectRef idx="0">
+            <a:schemeClr val="accent1"/>
+          </a:effectRef>
+          <a:fontRef idx="minor">
+            <a:schemeClr val="lt1"/>
+          </a:fontRef>
+        </p:style>
+        <p:txBody>
+          <a:bodyPr rtlCol="0" anchor="ctr"/>
+          <a:lstStyle/>
+          <a:p>
+            <a:pPr algn="ctr"/>
+            <a:endParaRPr lang="en-US" dirty="0">
+              <a:solidFill>
+                <a:schemeClr val="bg1">
+                  <a:lumMod val="50000"/>
+                </a:schemeClr>
+              </a:solidFill>
+            </a:endParaRPr>
+          </a:p>
+        </p:txBody>
+      </p:sp>
+      <p:sp>
+        <p:nvSpPr>
           <p:cNvPr id="2" name="Titel 1">
             <a:extLst>
               <a:ext uri="{FF2B5EF4-FFF2-40B4-BE49-F238E27FC236}">
@@ -3812,13 +4545,27 @@
             <p:ph type="title"/>
           </p:nvPr>
         </p:nvSpPr>
-        <p:spPr/>
-        <p:txBody>
-          <a:bodyPr/>
-          <a:lstStyle/>
-          <a:p>
-            <a:r>
-              <a:rPr lang="de-DE" dirty="0"/>
+        <p:spPr>
+          <a:xfrm>
+            <a:off x="1932903" y="949325"/>
+            <a:ext cx="8071706" cy="2387600"/>
+          </a:xfrm>
+        </p:spPr>
+        <p:txBody>
+          <a:bodyPr vert="horz" lIns="91440" tIns="45720" rIns="91440" bIns="45720" rtlCol="0" anchor="b">
+            <a:normAutofit/>
+          </a:bodyPr>
+          <a:lstStyle/>
+          <a:p>
+            <a:r>
+              <a:rPr lang="en-US" sz="6600" kern="1200">
+                <a:solidFill>
+                  <a:schemeClr val="bg1"/>
+                </a:solidFill>
+                <a:latin typeface="+mj-lt"/>
+                <a:ea typeface="+mj-ea"/>
+                <a:cs typeface="+mj-cs"/>
+              </a:rPr>
               <a:t>Quellen</a:t>
             </a:r>
           </a:p>
@@ -3840,18 +4587,139 @@
             <p:ph idx="1"/>
           </p:nvPr>
         </p:nvSpPr>
-        <p:spPr/>
-        <p:txBody>
-          <a:bodyPr/>
-          <a:lstStyle/>
-          <a:p>
-            <a:r>
-              <a:rPr lang="de-DE" dirty="0"/>
+        <p:spPr>
+          <a:xfrm>
+            <a:off x="1932902" y="3429000"/>
+            <a:ext cx="8071697" cy="1655762"/>
+          </a:xfrm>
+        </p:spPr>
+        <p:txBody>
+          <a:bodyPr vert="horz" lIns="91440" tIns="45720" rIns="91440" bIns="45720" rtlCol="0">
+            <a:normAutofit/>
+          </a:bodyPr>
+          <a:lstStyle/>
+          <a:p>
+            <a:pPr marL="0" indent="0">
+              <a:buNone/>
+            </a:pPr>
+            <a:r>
+              <a:rPr lang="en-US" sz="3200" kern="1200">
+                <a:solidFill>
+                  <a:schemeClr val="bg1"/>
+                </a:solidFill>
+                <a:latin typeface="+mn-lt"/>
+                <a:ea typeface="+mn-ea"/>
+                <a:cs typeface="+mn-cs"/>
+              </a:rPr>
               <a:t>https://de.rs-online.com/web/generalDisplay.html?id=ideen-und-tipps/mikrocontroller-leitfaden</a:t>
             </a:r>
           </a:p>
         </p:txBody>
       </p:sp>
+      <p:cxnSp>
+        <p:nvCxnSpPr>
+          <p:cNvPr id="10" name="Straight Connector 9">
+            <a:extLst>
+              <a:ext uri="{FF2B5EF4-FFF2-40B4-BE49-F238E27FC236}">
+                <a16:creationId xmlns:a16="http://schemas.microsoft.com/office/drawing/2014/main" id="{EC4521DE-248E-440D-AAD6-FD9E7D34B3BF}"/>
+              </a:ext>
+              <a:ext uri="{C183D7F6-B498-43B3-948B-1728B52AA6E4}">
+                <adec:decorative xmlns:adec="http://schemas.microsoft.com/office/drawing/2017/decorative" val="1"/>
+              </a:ext>
+            </a:extLst>
+          </p:cNvPr>
+          <p:cNvCxnSpPr>
+            <a:cxnSpLocks noGrp="1" noRot="1" noChangeAspect="1" noMove="1" noResize="1" noEditPoints="1" noAdjustHandles="1" noChangeArrowheads="1" noChangeShapeType="1"/>
+          </p:cNvCxnSpPr>
+          <p:nvPr>
+            <p:extLst>
+              <p:ext uri="{386F3935-93C4-4BCD-93E2-E3B085C9AB24}">
+                <p16:designElem xmlns:p16="http://schemas.microsoft.com/office/powerpoint/2015/main" val="1"/>
+              </p:ext>
+            </p:extLst>
+          </p:nvPr>
+        </p:nvCxnSpPr>
+        <p:spPr>
+          <a:xfrm>
+            <a:off x="585285" y="0"/>
+            <a:ext cx="0" cy="6858000"/>
+          </a:xfrm>
+          <a:prstGeom prst="line">
+            <a:avLst/>
+          </a:prstGeom>
+          <a:ln w="12700">
+            <a:solidFill>
+              <a:schemeClr val="accent2"/>
+            </a:solidFill>
+          </a:ln>
+        </p:spPr>
+        <p:style>
+          <a:lnRef idx="1">
+            <a:schemeClr val="accent1"/>
+          </a:lnRef>
+          <a:fillRef idx="0">
+            <a:schemeClr val="accent1"/>
+          </a:fillRef>
+          <a:effectRef idx="0">
+            <a:schemeClr val="accent1"/>
+          </a:effectRef>
+          <a:fontRef idx="minor">
+            <a:schemeClr val="tx1"/>
+          </a:fontRef>
+        </p:style>
+      </p:cxnSp>
+      <p:cxnSp>
+        <p:nvCxnSpPr>
+          <p:cNvPr id="12" name="Straight Connector 11">
+            <a:extLst>
+              <a:ext uri="{FF2B5EF4-FFF2-40B4-BE49-F238E27FC236}">
+                <a16:creationId xmlns:a16="http://schemas.microsoft.com/office/drawing/2014/main" id="{442C13FA-4C0F-42D0-9626-5BA6040D8C31}"/>
+              </a:ext>
+              <a:ext uri="{C183D7F6-B498-43B3-948B-1728B52AA6E4}">
+                <adec:decorative xmlns:adec="http://schemas.microsoft.com/office/drawing/2017/decorative" val="1"/>
+              </a:ext>
+            </a:extLst>
+          </p:cNvPr>
+          <p:cNvCxnSpPr>
+            <a:cxnSpLocks noGrp="1" noRot="1" noChangeAspect="1" noMove="1" noResize="1" noEditPoints="1" noAdjustHandles="1" noChangeArrowheads="1" noChangeShapeType="1"/>
+          </p:cNvCxnSpPr>
+          <p:nvPr>
+            <p:extLst>
+              <p:ext uri="{386F3935-93C4-4BCD-93E2-E3B085C9AB24}">
+                <p16:designElem xmlns:p16="http://schemas.microsoft.com/office/powerpoint/2015/main" val="1"/>
+              </p:ext>
+            </p:extLst>
+          </p:nvPr>
+        </p:nvCxnSpPr>
+        <p:spPr>
+          <a:xfrm flipH="1">
+            <a:off x="0" y="6252485"/>
+            <a:ext cx="12192000" cy="0"/>
+          </a:xfrm>
+          <a:prstGeom prst="line">
+            <a:avLst/>
+          </a:prstGeom>
+          <a:ln w="12700">
+            <a:solidFill>
+              <a:schemeClr val="accent2"/>
+            </a:solidFill>
+          </a:ln>
+        </p:spPr>
+        <p:style>
+          <a:lnRef idx="1">
+            <a:schemeClr val="accent1"/>
+          </a:lnRef>
+          <a:fillRef idx="0">
+            <a:schemeClr val="accent1"/>
+          </a:fillRef>
+          <a:effectRef idx="0">
+            <a:schemeClr val="accent1"/>
+          </a:effectRef>
+          <a:fontRef idx="minor">
+            <a:schemeClr val="tx1"/>
+          </a:fontRef>
+        </p:style>
+      </p:cxnSp>
     </p:spTree>
     <p:extLst>
       <p:ext uri="{BB962C8B-B14F-4D97-AF65-F5344CB8AC3E}">

</xml_diff>